<commit_message>
Added a symbol for the weather sensor to the architecture diagram
</commit_message>
<xml_diff>
--- a/doc/architecture.pptx
+++ b/doc/architecture.pptx
@@ -288,7 +288,7 @@
           <a:p>
             <a:fld id="{11C5A2E6-386A-4FC7-A61F-C511FD8D747F}" type="datetimeFigureOut">
               <a:rPr lang="de-DE" smtClean="0"/>
-              <a:t>23.02.2013</a:t>
+              <a:t>24.02.2013</a:t>
             </a:fld>
             <a:endParaRPr lang="de-DE"/>
           </a:p>
@@ -465,7 +465,7 @@
           <a:p>
             <a:fld id="{11C5A2E6-386A-4FC7-A61F-C511FD8D747F}" type="datetimeFigureOut">
               <a:rPr lang="de-DE" smtClean="0"/>
-              <a:t>23.02.2013</a:t>
+              <a:t>24.02.2013</a:t>
             </a:fld>
             <a:endParaRPr lang="de-DE"/>
           </a:p>
@@ -645,7 +645,7 @@
           <a:p>
             <a:fld id="{11C5A2E6-386A-4FC7-A61F-C511FD8D747F}" type="datetimeFigureOut">
               <a:rPr lang="de-DE" smtClean="0"/>
-              <a:t>23.02.2013</a:t>
+              <a:t>24.02.2013</a:t>
             </a:fld>
             <a:endParaRPr lang="de-DE"/>
           </a:p>
@@ -815,7 +815,7 @@
           <a:p>
             <a:fld id="{11C5A2E6-386A-4FC7-A61F-C511FD8D747F}" type="datetimeFigureOut">
               <a:rPr lang="de-DE" smtClean="0"/>
-              <a:t>23.02.2013</a:t>
+              <a:t>24.02.2013</a:t>
             </a:fld>
             <a:endParaRPr lang="de-DE"/>
           </a:p>
@@ -1068,7 +1068,7 @@
           <a:p>
             <a:fld id="{11C5A2E6-386A-4FC7-A61F-C511FD8D747F}" type="datetimeFigureOut">
               <a:rPr lang="de-DE" smtClean="0"/>
-              <a:t>23.02.2013</a:t>
+              <a:t>24.02.2013</a:t>
             </a:fld>
             <a:endParaRPr lang="de-DE"/>
           </a:p>
@@ -1363,7 +1363,7 @@
           <a:p>
             <a:fld id="{11C5A2E6-386A-4FC7-A61F-C511FD8D747F}" type="datetimeFigureOut">
               <a:rPr lang="de-DE" smtClean="0"/>
-              <a:t>23.02.2013</a:t>
+              <a:t>24.02.2013</a:t>
             </a:fld>
             <a:endParaRPr lang="de-DE"/>
           </a:p>
@@ -1792,7 +1792,7 @@
           <a:p>
             <a:fld id="{11C5A2E6-386A-4FC7-A61F-C511FD8D747F}" type="datetimeFigureOut">
               <a:rPr lang="de-DE" smtClean="0"/>
-              <a:t>23.02.2013</a:t>
+              <a:t>24.02.2013</a:t>
             </a:fld>
             <a:endParaRPr lang="de-DE"/>
           </a:p>
@@ -1910,7 +1910,7 @@
           <a:p>
             <a:fld id="{11C5A2E6-386A-4FC7-A61F-C511FD8D747F}" type="datetimeFigureOut">
               <a:rPr lang="de-DE" smtClean="0"/>
-              <a:t>23.02.2013</a:t>
+              <a:t>24.02.2013</a:t>
             </a:fld>
             <a:endParaRPr lang="de-DE"/>
           </a:p>
@@ -2005,7 +2005,7 @@
           <a:p>
             <a:fld id="{11C5A2E6-386A-4FC7-A61F-C511FD8D747F}" type="datetimeFigureOut">
               <a:rPr lang="de-DE" smtClean="0"/>
-              <a:t>23.02.2013</a:t>
+              <a:t>24.02.2013</a:t>
             </a:fld>
             <a:endParaRPr lang="de-DE"/>
           </a:p>
@@ -2282,7 +2282,7 @@
           <a:p>
             <a:fld id="{11C5A2E6-386A-4FC7-A61F-C511FD8D747F}" type="datetimeFigureOut">
               <a:rPr lang="de-DE" smtClean="0"/>
-              <a:t>23.02.2013</a:t>
+              <a:t>24.02.2013</a:t>
             </a:fld>
             <a:endParaRPr lang="de-DE"/>
           </a:p>
@@ -2535,7 +2535,7 @@
           <a:p>
             <a:fld id="{11C5A2E6-386A-4FC7-A61F-C511FD8D747F}" type="datetimeFigureOut">
               <a:rPr lang="de-DE" smtClean="0"/>
-              <a:t>23.02.2013</a:t>
+              <a:t>24.02.2013</a:t>
             </a:fld>
             <a:endParaRPr lang="de-DE"/>
           </a:p>
@@ -2748,7 +2748,7 @@
           <a:p>
             <a:fld id="{11C5A2E6-386A-4FC7-A61F-C511FD8D747F}" type="datetimeFigureOut">
               <a:rPr lang="de-DE" smtClean="0"/>
-              <a:t>23.02.2013</a:t>
+              <a:t>24.02.2013</a:t>
             </a:fld>
             <a:endParaRPr lang="de-DE"/>
           </a:p>
@@ -3417,14 +3417,12 @@
       <p:cxnSp>
         <p:nvCxnSpPr>
           <p:cNvPr id="7" name="Gerade Verbindung 6"/>
-          <p:cNvCxnSpPr>
-            <a:endCxn id="4" idx="0"/>
-          </p:cNvCxnSpPr>
+          <p:cNvCxnSpPr/>
           <p:nvPr/>
         </p:nvCxnSpPr>
         <p:spPr>
           <a:xfrm>
-            <a:off x="2051720" y="3790781"/>
+            <a:off x="2747226" y="3774811"/>
             <a:ext cx="0" cy="864096"/>
           </a:xfrm>
           <a:prstGeom prst="line">
@@ -3459,7 +3457,7 @@
         </p:nvSpPr>
         <p:spPr>
           <a:xfrm>
-            <a:off x="1835696" y="3358733"/>
+            <a:off x="2531202" y="3367078"/>
             <a:ext cx="432048" cy="432048"/>
           </a:xfrm>
           <a:prstGeom prst="flowChartConnector">
@@ -3753,8 +3751,8 @@
         </p:nvSpPr>
         <p:spPr>
           <a:xfrm>
-            <a:off x="899592" y="3251591"/>
-            <a:ext cx="1080120" cy="523220"/>
+            <a:off x="1907704" y="3553852"/>
+            <a:ext cx="867883" cy="523220"/>
           </a:xfrm>
           <a:prstGeom prst="rect">
             <a:avLst/>
@@ -3964,7 +3962,7 @@
         </p:blipFill>
         <p:spPr bwMode="auto">
           <a:xfrm>
-            <a:off x="2742059" y="3174597"/>
+            <a:off x="3461381" y="3166430"/>
             <a:ext cx="1685925" cy="2381250"/>
           </a:xfrm>
           <a:prstGeom prst="rect">
@@ -3990,8 +3988,8 @@
         </p:nvCxnSpPr>
         <p:spPr>
           <a:xfrm flipH="1">
-            <a:off x="3779912" y="3632500"/>
-            <a:ext cx="1224136" cy="0"/>
+            <a:off x="4572000" y="3632500"/>
+            <a:ext cx="432048" cy="0"/>
           </a:xfrm>
           <a:prstGeom prst="straightConnector1">
             <a:avLst/>
@@ -4026,7 +4024,7 @@
         </p:nvCxnSpPr>
         <p:spPr>
           <a:xfrm flipH="1">
-            <a:off x="2339752" y="3632500"/>
+            <a:off x="2963250" y="3632500"/>
             <a:ext cx="612068" cy="0"/>
           </a:xfrm>
           <a:prstGeom prst="straightConnector1">
@@ -4062,7 +4060,7 @@
         </p:nvSpPr>
         <p:spPr>
           <a:xfrm>
-            <a:off x="3059832" y="4038163"/>
+            <a:off x="2823105" y="3790781"/>
             <a:ext cx="812791" cy="307777"/>
           </a:xfrm>
           <a:prstGeom prst="rect">
@@ -4521,6 +4519,210 @@
           </a:extLst>
         </p:spPr>
       </p:pic>
+      <p:pic>
+        <p:nvPicPr>
+          <p:cNvPr id="1026" name="Picture 2" descr="C:\Devel\Ruby\workspace\raspberry-pi-weather\doc\weather-few-clouds.png"/>
+          <p:cNvPicPr>
+            <a:picLocks noChangeAspect="1" noChangeArrowheads="1"/>
+          </p:cNvPicPr>
+          <p:nvPr/>
+        </p:nvPicPr>
+        <p:blipFill>
+          <a:blip r:embed="rId8" cstate="print">
+            <a:extLst>
+              <a:ext uri="{28A0092B-C50C-407E-A947-70E740481C1C}">
+                <a14:useLocalDpi xmlns:a14="http://schemas.microsoft.com/office/drawing/2010/main" val="0"/>
+              </a:ext>
+            </a:extLst>
+          </a:blip>
+          <a:srcRect/>
+          <a:stretch>
+            <a:fillRect/>
+          </a:stretch>
+        </p:blipFill>
+        <p:spPr bwMode="auto">
+          <a:xfrm>
+            <a:off x="467544" y="3036951"/>
+            <a:ext cx="476250" cy="476250"/>
+          </a:xfrm>
+          <a:prstGeom prst="rect">
+            <a:avLst/>
+          </a:prstGeom>
+          <a:noFill/>
+          <a:extLst>
+            <a:ext uri="{909E8E84-426E-40DD-AFC4-6F175D3DCCD1}">
+              <a14:hiddenFill xmlns:a14="http://schemas.microsoft.com/office/drawing/2010/main">
+                <a:solidFill>
+                  <a:srgbClr val="FFFFFF"/>
+                </a:solidFill>
+              </a14:hiddenFill>
+            </a:ext>
+          </a:extLst>
+        </p:spPr>
+      </p:pic>
+      <p:pic>
+        <p:nvPicPr>
+          <p:cNvPr id="9" name="Picture 3" descr="C:\Devel\Ruby\workspace\raspberry-pi-weather\doc\thegemini_wireless_sensor.png"/>
+          <p:cNvPicPr>
+            <a:picLocks noChangeAspect="1" noChangeArrowheads="1"/>
+          </p:cNvPicPr>
+          <p:nvPr/>
+        </p:nvPicPr>
+        <p:blipFill>
+          <a:blip r:embed="rId9" cstate="print">
+            <a:extLst>
+              <a:ext uri="{28A0092B-C50C-407E-A947-70E740481C1C}">
+                <a14:useLocalDpi xmlns:a14="http://schemas.microsoft.com/office/drawing/2010/main" val="0"/>
+              </a:ext>
+            </a:extLst>
+          </a:blip>
+          <a:srcRect/>
+          <a:stretch>
+            <a:fillRect/>
+          </a:stretch>
+        </p:blipFill>
+        <p:spPr bwMode="auto">
+          <a:xfrm>
+            <a:off x="938210" y="2877090"/>
+            <a:ext cx="505778" cy="714375"/>
+          </a:xfrm>
+          <a:prstGeom prst="rect">
+            <a:avLst/>
+          </a:prstGeom>
+          <a:noFill/>
+          <a:extLst>
+            <a:ext uri="{909E8E84-426E-40DD-AFC4-6F175D3DCCD1}">
+              <a14:hiddenFill xmlns:a14="http://schemas.microsoft.com/office/drawing/2010/main">
+                <a:solidFill>
+                  <a:srgbClr val="FFFFFF"/>
+                </a:solidFill>
+              </a14:hiddenFill>
+            </a:ext>
+          </a:extLst>
+        </p:spPr>
+      </p:pic>
+      <p:sp>
+        <p:nvSpPr>
+          <p:cNvPr id="36" name="Rechteck 35"/>
+          <p:cNvSpPr/>
+          <p:nvPr/>
+        </p:nvSpPr>
+        <p:spPr>
+          <a:xfrm>
+            <a:off x="406293" y="2966982"/>
+            <a:ext cx="1141371" cy="607775"/>
+          </a:xfrm>
+          <a:prstGeom prst="rect">
+            <a:avLst/>
+          </a:prstGeom>
+          <a:noFill/>
+          <a:ln>
+            <a:solidFill>
+              <a:schemeClr val="tx1"/>
+            </a:solidFill>
+          </a:ln>
+        </p:spPr>
+        <p:style>
+          <a:lnRef idx="2">
+            <a:schemeClr val="accent1">
+              <a:shade val="50000"/>
+            </a:schemeClr>
+          </a:lnRef>
+          <a:fillRef idx="1">
+            <a:schemeClr val="accent1"/>
+          </a:fillRef>
+          <a:effectRef idx="0">
+            <a:schemeClr val="accent1"/>
+          </a:effectRef>
+          <a:fontRef idx="minor">
+            <a:schemeClr val="lt1"/>
+          </a:fontRef>
+        </p:style>
+        <p:txBody>
+          <a:bodyPr rtlCol="0" anchor="ctr"/>
+          <a:lstStyle/>
+          <a:p>
+            <a:pPr algn="ctr"/>
+            <a:endParaRPr lang="de-DE">
+              <a:solidFill>
+                <a:schemeClr val="tx1"/>
+              </a:solidFill>
+            </a:endParaRPr>
+          </a:p>
+        </p:txBody>
+      </p:sp>
+      <p:sp>
+        <p:nvSpPr>
+          <p:cNvPr id="42" name="Textfeld 41"/>
+          <p:cNvSpPr txBox="1"/>
+          <p:nvPr/>
+        </p:nvSpPr>
+        <p:spPr>
+          <a:xfrm>
+            <a:off x="406293" y="3573016"/>
+            <a:ext cx="867883" cy="523220"/>
+          </a:xfrm>
+          <a:prstGeom prst="rect">
+            <a:avLst/>
+          </a:prstGeom>
+          <a:noFill/>
+        </p:spPr>
+        <p:txBody>
+          <a:bodyPr wrap="square" rtlCol="0">
+            <a:spAutoFit/>
+          </a:bodyPr>
+          <a:lstStyle>
+            <a:defPPr>
+              <a:defRPr lang="de-DE"/>
+            </a:defPPr>
+            <a:lvl1pPr>
+              <a:defRPr sz="1400"/>
+            </a:lvl1pPr>
+          </a:lstStyle>
+          <a:p>
+            <a:r>
+              <a:rPr lang="en-US" smtClean="0"/>
+              <a:t>SHT21 sensor</a:t>
+            </a:r>
+            <a:endParaRPr lang="en-US"/>
+          </a:p>
+        </p:txBody>
+      </p:sp>
+      <p:cxnSp>
+        <p:nvCxnSpPr>
+          <p:cNvPr id="43" name="Gerade Verbindung 42"/>
+          <p:cNvCxnSpPr/>
+          <p:nvPr/>
+        </p:nvCxnSpPr>
+        <p:spPr>
+          <a:xfrm>
+            <a:off x="1033528" y="3573016"/>
+            <a:ext cx="0" cy="1071757"/>
+          </a:xfrm>
+          <a:prstGeom prst="line">
+            <a:avLst/>
+          </a:prstGeom>
+          <a:ln w="25400">
+            <a:solidFill>
+              <a:schemeClr val="tx1"/>
+            </a:solidFill>
+          </a:ln>
+        </p:spPr>
+        <p:style>
+          <a:lnRef idx="1">
+            <a:schemeClr val="accent1"/>
+          </a:lnRef>
+          <a:fillRef idx="0">
+            <a:schemeClr val="accent1"/>
+          </a:fillRef>
+          <a:effectRef idx="0">
+            <a:schemeClr val="accent1"/>
+          </a:effectRef>
+          <a:fontRef idx="minor">
+            <a:schemeClr val="tx1"/>
+          </a:fontRef>
+        </p:style>
+      </p:cxnSp>
     </p:spTree>
     <p:extLst>
       <p:ext uri="{BB962C8B-B14F-4D97-AF65-F5344CB8AC3E}">

</xml_diff>